<commit_message>
Added ERD in PPT
</commit_message>
<xml_diff>
--- a/7. Group Project/W7D5_Project/Powerpoint/Watch Me Whip (UPDATED).pptx
+++ b/7. Group Project/W7D5_Project/Powerpoint/Watch Me Whip (UPDATED).pptx
@@ -14,14 +14,15 @@
     <p:sldId id="267" r:id="rId8"/>
     <p:sldId id="257" r:id="rId9"/>
     <p:sldId id="268" r:id="rId10"/>
-    <p:sldId id="261" r:id="rId11"/>
-    <p:sldId id="269" r:id="rId12"/>
-    <p:sldId id="272" r:id="rId13"/>
-    <p:sldId id="270" r:id="rId14"/>
-    <p:sldId id="273" r:id="rId15"/>
-    <p:sldId id="271" r:id="rId16"/>
-    <p:sldId id="262" r:id="rId17"/>
-    <p:sldId id="264" r:id="rId18"/>
+    <p:sldId id="274" r:id="rId11"/>
+    <p:sldId id="261" r:id="rId12"/>
+    <p:sldId id="269" r:id="rId13"/>
+    <p:sldId id="272" r:id="rId14"/>
+    <p:sldId id="270" r:id="rId15"/>
+    <p:sldId id="273" r:id="rId16"/>
+    <p:sldId id="271" r:id="rId17"/>
+    <p:sldId id="262" r:id="rId18"/>
+    <p:sldId id="264" r:id="rId19"/>
   </p:sldIdLst>
   <p:sldSz cx="9144000" cy="6858000" type="screen4x3"/>
   <p:notesSz cx="6858000" cy="9144000"/>
@@ -6277,36 +6278,67 @@
           <a:p>
             <a:r>
               <a:rPr lang="en-US" dirty="0" smtClean="0"/>
-              <a:t>UML Diagram</a:t>
-            </a:r>
+              <a:t>Entity Relationship Diagram</a:t>
+            </a:r>
+            <a:endParaRPr lang="en-US" dirty="0"/>
+          </a:p>
+        </p:txBody>
+      </p:sp>
+      <p:sp>
+        <p:nvSpPr>
+          <p:cNvPr id="5" name="Text Placeholder 4"/>
+          <p:cNvSpPr>
+            <a:spLocks noGrp="1"/>
+          </p:cNvSpPr>
+          <p:nvPr>
+            <p:ph type="body" idx="2"/>
+          </p:nvPr>
+        </p:nvSpPr>
+        <p:spPr/>
+        <p:txBody>
+          <a:bodyPr/>
+          <a:lstStyle/>
+          <a:p>
+            <a:r>
+              <a:rPr lang="en-US" dirty="0" smtClean="0"/>
+              <a:t>Fin</a:t>
+            </a:r>
+            <a:r>
+              <a:rPr lang="en-US" dirty="0" smtClean="0"/>
+              <a:t>al </a:t>
+            </a:r>
+            <a:r>
+              <a:rPr lang="en-US" dirty="0" smtClean="0"/>
+              <a:t>Diagram</a:t>
+            </a:r>
+          </a:p>
+          <a:p>
             <a:endParaRPr lang="en-US" dirty="0"/>
           </a:p>
         </p:txBody>
       </p:sp>
       <p:pic>
         <p:nvPicPr>
-          <p:cNvPr id="1026" name="Picture 2" descr="D:\gitvob\Group2Projects\7. Group Project\W6D5_Project\UML DIAGRAMS\W6D5_USECASE_PIC.jpg"/>
+          <p:cNvPr id="6" name="Picture 5" descr="Entity Relationship Diagram - W7D5 ERD.png"/>
           <p:cNvPicPr>
-            <a:picLocks noChangeAspect="1" noChangeArrowheads="1"/>
+            <a:picLocks noChangeAspect="1"/>
           </p:cNvPicPr>
           <p:nvPr/>
         </p:nvPicPr>
         <p:blipFill>
           <a:blip r:embed="rId2" cstate="print"/>
-          <a:srcRect/>
           <a:stretch>
             <a:fillRect/>
           </a:stretch>
         </p:blipFill>
-        <p:spPr bwMode="auto">
-          <a:xfrm>
-            <a:off x="0" y="1905000"/>
-            <a:ext cx="9080797" cy="3848101"/>
+        <p:spPr>
+          <a:xfrm>
+            <a:off x="2677115" y="-1"/>
+            <a:ext cx="6466886" cy="6858001"/>
           </a:xfrm>
           <a:prstGeom prst="rect">
             <a:avLst/>
           </a:prstGeom>
-          <a:noFill/>
         </p:spPr>
       </p:pic>
     </p:spTree>
@@ -6314,6 +6346,13 @@
   <p:clrMapOvr>
     <a:masterClrMapping/>
   </p:clrMapOvr>
+  <p:timing>
+    <p:tnLst>
+      <p:par>
+        <p:cTn id="1" dur="indefinite" restart="never" nodeType="tmRoot"/>
+      </p:par>
+    </p:tnLst>
+  </p:timing>
 </p:sld>
 </file>
 
@@ -6359,75 +6398,30 @@
       </p:sp>
       <p:pic>
         <p:nvPicPr>
-          <p:cNvPr id="4" name="Picture 3" descr="UseCaseDiagramPic.jpg"/>
+          <p:cNvPr id="1026" name="Picture 2" descr="D:\gitvob\Group2Projects\7. Group Project\W6D5_Project\UML DIAGRAMS\W6D5_USECASE_PIC.jpg"/>
           <p:cNvPicPr>
-            <a:picLocks noChangeAspect="1"/>
+            <a:picLocks noChangeAspect="1" noChangeArrowheads="1"/>
           </p:cNvPicPr>
           <p:nvPr/>
         </p:nvPicPr>
         <p:blipFill>
           <a:blip r:embed="rId2" cstate="print"/>
-          <a:srcRect t="18184"/>
+          <a:srcRect/>
           <a:stretch>
             <a:fillRect/>
           </a:stretch>
         </p:blipFill>
-        <p:spPr>
-          <a:xfrm>
-            <a:off x="152400" y="1524000"/>
-            <a:ext cx="8839200" cy="4572000"/>
+        <p:spPr bwMode="auto">
+          <a:xfrm>
+            <a:off x="0" y="1905000"/>
+            <a:ext cx="9080797" cy="3848101"/>
           </a:xfrm>
           <a:prstGeom prst="rect">
             <a:avLst/>
           </a:prstGeom>
+          <a:noFill/>
         </p:spPr>
       </p:pic>
-      <p:sp>
-        <p:nvSpPr>
-          <p:cNvPr id="5" name="Rectangle 4"/>
-          <p:cNvSpPr/>
-          <p:nvPr/>
-        </p:nvSpPr>
-        <p:spPr>
-          <a:xfrm>
-            <a:off x="3962400" y="5105400"/>
-            <a:ext cx="304800" cy="228600"/>
-          </a:xfrm>
-          <a:prstGeom prst="rect">
-            <a:avLst/>
-          </a:prstGeom>
-          <a:solidFill>
-            <a:srgbClr val="ECECEC"/>
-          </a:solidFill>
-          <a:ln>
-            <a:noFill/>
-          </a:ln>
-        </p:spPr>
-        <p:style>
-          <a:lnRef idx="2">
-            <a:schemeClr val="accent1">
-              <a:shade val="50000"/>
-            </a:schemeClr>
-          </a:lnRef>
-          <a:fillRef idx="1">
-            <a:schemeClr val="accent1"/>
-          </a:fillRef>
-          <a:effectRef idx="0">
-            <a:schemeClr val="accent1"/>
-          </a:effectRef>
-          <a:fontRef idx="minor">
-            <a:schemeClr val="lt1"/>
-          </a:fontRef>
-        </p:style>
-        <p:txBody>
-          <a:bodyPr rtlCol="0" anchor="ctr"/>
-          <a:lstStyle/>
-          <a:p>
-            <a:pPr algn="ctr"/>
-            <a:endParaRPr lang="en-US"/>
-          </a:p>
-        </p:txBody>
-      </p:sp>
     </p:spTree>
   </p:cSld>
   <p:clrMapOvr>
@@ -6476,6 +6470,31 @@
           </a:p>
         </p:txBody>
       </p:sp>
+      <p:pic>
+        <p:nvPicPr>
+          <p:cNvPr id="4" name="Picture 3" descr="UseCaseDiagramPic.jpg"/>
+          <p:cNvPicPr>
+            <a:picLocks noChangeAspect="1"/>
+          </p:cNvPicPr>
+          <p:nvPr/>
+        </p:nvPicPr>
+        <p:blipFill>
+          <a:blip r:embed="rId2" cstate="print"/>
+          <a:srcRect t="18184"/>
+          <a:stretch>
+            <a:fillRect/>
+          </a:stretch>
+        </p:blipFill>
+        <p:spPr>
+          <a:xfrm>
+            <a:off x="152400" y="1524000"/>
+            <a:ext cx="8839200" cy="4572000"/>
+          </a:xfrm>
+          <a:prstGeom prst="rect">
+            <a:avLst/>
+          </a:prstGeom>
+        </p:spPr>
+      </p:pic>
       <p:sp>
         <p:nvSpPr>
           <p:cNvPr id="5" name="Rectangle 4"/>
@@ -6522,30 +6541,6 @@
           </a:p>
         </p:txBody>
       </p:sp>
-      <p:pic>
-        <p:nvPicPr>
-          <p:cNvPr id="7" name="Picture 6" descr="W6D5_CLASSDIAGRAM.jpg"/>
-          <p:cNvPicPr>
-            <a:picLocks noChangeAspect="1"/>
-          </p:cNvPicPr>
-          <p:nvPr/>
-        </p:nvPicPr>
-        <p:blipFill>
-          <a:blip r:embed="rId2" cstate="print"/>
-          <a:stretch>
-            <a:fillRect/>
-          </a:stretch>
-        </p:blipFill>
-        <p:spPr>
-          <a:xfrm>
-            <a:off x="457200" y="1600200"/>
-            <a:ext cx="8169800" cy="4419600"/>
-          </a:xfrm>
-          <a:prstGeom prst="rect">
-            <a:avLst/>
-          </a:prstGeom>
-        </p:spPr>
-      </p:pic>
     </p:spTree>
   </p:cSld>
   <p:clrMapOvr>
@@ -6594,9 +6589,55 @@
           </a:p>
         </p:txBody>
       </p:sp>
+      <p:sp>
+        <p:nvSpPr>
+          <p:cNvPr id="5" name="Rectangle 4"/>
+          <p:cNvSpPr/>
+          <p:nvPr/>
+        </p:nvSpPr>
+        <p:spPr>
+          <a:xfrm>
+            <a:off x="3962400" y="5105400"/>
+            <a:ext cx="304800" cy="228600"/>
+          </a:xfrm>
+          <a:prstGeom prst="rect">
+            <a:avLst/>
+          </a:prstGeom>
+          <a:solidFill>
+            <a:srgbClr val="ECECEC"/>
+          </a:solidFill>
+          <a:ln>
+            <a:noFill/>
+          </a:ln>
+        </p:spPr>
+        <p:style>
+          <a:lnRef idx="2">
+            <a:schemeClr val="accent1">
+              <a:shade val="50000"/>
+            </a:schemeClr>
+          </a:lnRef>
+          <a:fillRef idx="1">
+            <a:schemeClr val="accent1"/>
+          </a:fillRef>
+          <a:effectRef idx="0">
+            <a:schemeClr val="accent1"/>
+          </a:effectRef>
+          <a:fontRef idx="minor">
+            <a:schemeClr val="lt1"/>
+          </a:fontRef>
+        </p:style>
+        <p:txBody>
+          <a:bodyPr rtlCol="0" anchor="ctr"/>
+          <a:lstStyle/>
+          <a:p>
+            <a:pPr algn="ctr"/>
+            <a:endParaRPr lang="en-US"/>
+          </a:p>
+        </p:txBody>
+      </p:sp>
       <p:pic>
         <p:nvPicPr>
-          <p:cNvPr id="4" name="Picture 3" descr="ClassDiagramPic.jpg"/>
+          <p:cNvPr id="7" name="Picture 6" descr="W6D5_CLASSDIAGRAM.jpg"/>
           <p:cNvPicPr>
             <a:picLocks noChangeAspect="1"/>
           </p:cNvPicPr>
@@ -6610,8 +6651,8 @@
         </p:blipFill>
         <p:spPr>
           <a:xfrm>
-            <a:off x="152400" y="1676400"/>
-            <a:ext cx="8839200" cy="4104381"/>
+            <a:off x="457200" y="1600200"/>
+            <a:ext cx="8169800" cy="4419600"/>
           </a:xfrm>
           <a:prstGeom prst="rect">
             <a:avLst/>
@@ -6668,7 +6709,7 @@
       </p:sp>
       <p:pic>
         <p:nvPicPr>
-          <p:cNvPr id="4" name="Picture 3" descr="W6D5_SEQUENCEDIAGRAM.jpg"/>
+          <p:cNvPr id="4" name="Picture 3" descr="ClassDiagramPic.jpg"/>
           <p:cNvPicPr>
             <a:picLocks noChangeAspect="1"/>
           </p:cNvPicPr>
@@ -6676,15 +6717,14 @@
         </p:nvPicPr>
         <p:blipFill>
           <a:blip r:embed="rId2" cstate="print"/>
-          <a:srcRect b="31111"/>
           <a:stretch>
             <a:fillRect/>
           </a:stretch>
         </p:blipFill>
         <p:spPr>
           <a:xfrm>
-            <a:off x="1447800" y="1524000"/>
-            <a:ext cx="6158204" cy="4724400"/>
+            <a:off x="152400" y="1676400"/>
+            <a:ext cx="8839200" cy="4104381"/>
           </a:xfrm>
           <a:prstGeom prst="rect">
             <a:avLst/>
@@ -6741,7 +6781,7 @@
       </p:sp>
       <p:pic>
         <p:nvPicPr>
-          <p:cNvPr id="6" name="Picture 5" descr="SequenceDiagram2.jpg"/>
+          <p:cNvPr id="4" name="Picture 3" descr="W6D5_SEQUENCEDIAGRAM.jpg"/>
           <p:cNvPicPr>
             <a:picLocks noChangeAspect="1"/>
           </p:cNvPicPr>
@@ -6749,15 +6789,15 @@
         </p:nvPicPr>
         <p:blipFill>
           <a:blip r:embed="rId2" cstate="print"/>
-          <a:srcRect b="3390"/>
+          <a:srcRect b="31111"/>
           <a:stretch>
             <a:fillRect/>
           </a:stretch>
         </p:blipFill>
         <p:spPr>
           <a:xfrm>
-            <a:off x="304800" y="1524000"/>
-            <a:ext cx="8534400" cy="4800600"/>
+            <a:off x="1447800" y="1524000"/>
+            <a:ext cx="6158204" cy="4724400"/>
           </a:xfrm>
           <a:prstGeom prst="rect">
             <a:avLst/>
@@ -6806,169 +6846,37 @@
           <a:p>
             <a:r>
               <a:rPr lang="en-US" dirty="0" smtClean="0"/>
-              <a:t>Detailed Functions Per User</a:t>
+              <a:t>UML Diagram</a:t>
             </a:r>
             <a:endParaRPr lang="en-US" dirty="0"/>
           </a:p>
         </p:txBody>
       </p:sp>
-      <p:sp>
-        <p:nvSpPr>
-          <p:cNvPr id="3" name="Content Placeholder 2"/>
-          <p:cNvSpPr>
-            <a:spLocks noGrp="1"/>
-          </p:cNvSpPr>
-          <p:nvPr>
-            <p:ph sz="quarter" idx="1"/>
-          </p:nvPr>
-        </p:nvSpPr>
-        <p:spPr/>
-        <p:txBody>
-          <a:bodyPr>
-            <a:normAutofit fontScale="77500" lnSpcReduction="20000"/>
-          </a:bodyPr>
-          <a:lstStyle/>
-          <a:p>
-            <a:r>
-              <a:rPr lang="en-US" dirty="0" smtClean="0"/>
-              <a:t>Customer</a:t>
-            </a:r>
-          </a:p>
-          <a:p>
-            <a:pPr lvl="1"/>
-            <a:r>
-              <a:rPr lang="en-US" dirty="0" smtClean="0"/>
-              <a:t>Register/Login/Logout</a:t>
-            </a:r>
-          </a:p>
-          <a:p>
-            <a:pPr lvl="1"/>
-            <a:r>
-              <a:rPr lang="en-US" dirty="0" smtClean="0"/>
-              <a:t>Browse products</a:t>
-            </a:r>
-          </a:p>
-          <a:p>
-            <a:pPr lvl="1"/>
-            <a:r>
-              <a:rPr lang="en-US" dirty="0" smtClean="0"/>
-              <a:t>Add to Cart</a:t>
-            </a:r>
-          </a:p>
-          <a:p>
-            <a:pPr lvl="1"/>
-            <a:r>
-              <a:rPr lang="en-US" dirty="0" smtClean="0"/>
-              <a:t>Edit cart</a:t>
-            </a:r>
-          </a:p>
-          <a:p>
-            <a:pPr lvl="1"/>
-            <a:r>
-              <a:rPr lang="en-US" dirty="0" smtClean="0"/>
-              <a:t>Remove product from cart</a:t>
-            </a:r>
-          </a:p>
-          <a:p>
-            <a:pPr lvl="1"/>
-            <a:r>
-              <a:rPr lang="en-US" dirty="0" smtClean="0"/>
-              <a:t>Add Product to favorite</a:t>
-            </a:r>
-          </a:p>
-          <a:p>
-            <a:pPr lvl="1"/>
-            <a:r>
-              <a:rPr lang="en-US" dirty="0" smtClean="0"/>
-              <a:t>Request for a premium account</a:t>
-            </a:r>
-          </a:p>
-          <a:p>
-            <a:pPr lvl="1"/>
-            <a:r>
-              <a:rPr lang="en-US" dirty="0" smtClean="0"/>
-              <a:t>View Product Details/Reviews</a:t>
-            </a:r>
-          </a:p>
-          <a:p>
-            <a:pPr lvl="1"/>
-            <a:r>
-              <a:rPr lang="en-US" dirty="0" smtClean="0"/>
-              <a:t>Post/Delete Product Reviews</a:t>
-            </a:r>
-          </a:p>
-          <a:p>
-            <a:pPr lvl="1"/>
-            <a:r>
-              <a:rPr lang="en-US" dirty="0" smtClean="0"/>
-              <a:t>Update account details</a:t>
-            </a:r>
-          </a:p>
-          <a:p>
-            <a:pPr lvl="1">
-              <a:buNone/>
-            </a:pPr>
-            <a:endParaRPr lang="en-US" dirty="0" smtClean="0"/>
-          </a:p>
-          <a:p>
-            <a:r>
-              <a:rPr lang="en-US" dirty="0" smtClean="0"/>
-              <a:t>Admin</a:t>
-            </a:r>
-          </a:p>
-          <a:p>
-            <a:pPr lvl="1"/>
-            <a:r>
-              <a:rPr lang="en-US" dirty="0" smtClean="0"/>
-              <a:t>Start Admin Topic consumer</a:t>
-            </a:r>
-          </a:p>
-          <a:p>
-            <a:pPr lvl="1"/>
-            <a:r>
-              <a:rPr lang="en-US" dirty="0" smtClean="0"/>
-              <a:t>Approve/Reject Customer premium requests</a:t>
-            </a:r>
-          </a:p>
-          <a:p>
-            <a:pPr lvl="1"/>
-            <a:r>
-              <a:rPr lang="en-US" dirty="0" smtClean="0"/>
-              <a:t>Manage User, Admin, </a:t>
-            </a:r>
-            <a:r>
-              <a:rPr lang="en-US" dirty="0" smtClean="0"/>
-              <a:t>Orders (CRUD)</a:t>
-            </a:r>
-          </a:p>
-          <a:p>
-            <a:pPr lvl="1"/>
-            <a:r>
-              <a:rPr lang="en-US" dirty="0" smtClean="0"/>
-              <a:t>Check online users</a:t>
-            </a:r>
-            <a:endParaRPr lang="en-US" dirty="0" smtClean="0"/>
-          </a:p>
-          <a:p>
-            <a:pPr lvl="1"/>
-            <a:endParaRPr lang="en-US" dirty="0" smtClean="0"/>
-          </a:p>
-          <a:p>
-            <a:endParaRPr lang="en-US" dirty="0" smtClean="0"/>
-          </a:p>
-          <a:p>
-            <a:pPr lvl="1"/>
-            <a:endParaRPr lang="en-US" dirty="0" smtClean="0"/>
-          </a:p>
-          <a:p>
-            <a:pPr lvl="1"/>
-            <a:endParaRPr lang="en-US" dirty="0" smtClean="0"/>
-          </a:p>
-          <a:p>
-            <a:endParaRPr lang="en-US" dirty="0" smtClean="0"/>
-          </a:p>
-        </p:txBody>
-      </p:sp>
+      <p:pic>
+        <p:nvPicPr>
+          <p:cNvPr id="6" name="Picture 5" descr="SequenceDiagram2.jpg"/>
+          <p:cNvPicPr>
+            <a:picLocks noChangeAspect="1"/>
+          </p:cNvPicPr>
+          <p:nvPr/>
+        </p:nvPicPr>
+        <p:blipFill>
+          <a:blip r:embed="rId2" cstate="print"/>
+          <a:srcRect b="3390"/>
+          <a:stretch>
+            <a:fillRect/>
+          </a:stretch>
+        </p:blipFill>
+        <p:spPr>
+          <a:xfrm>
+            <a:off x="304800" y="1524000"/>
+            <a:ext cx="8534400" cy="4800600"/>
+          </a:xfrm>
+          <a:prstGeom prst="rect">
+            <a:avLst/>
+          </a:prstGeom>
+        </p:spPr>
+      </p:pic>
     </p:spTree>
   </p:cSld>
   <p:clrMapOvr>
@@ -6978,6 +6886,206 @@
 </file>
 
 <file path=ppt/slides/slide17.xml><?xml version="1.0" encoding="utf-8"?>
+<p:sld xmlns:a="http://schemas.openxmlformats.org/drawingml/2006/main" xmlns:r="http://schemas.openxmlformats.org/officeDocument/2006/relationships" xmlns:p="http://schemas.openxmlformats.org/presentationml/2006/main">
+  <p:cSld>
+    <p:spTree>
+      <p:nvGrpSpPr>
+        <p:cNvPr id="1" name=""/>
+        <p:cNvGrpSpPr/>
+        <p:nvPr/>
+      </p:nvGrpSpPr>
+      <p:grpSpPr>
+        <a:xfrm>
+          <a:off x="0" y="0"/>
+          <a:ext cx="0" cy="0"/>
+          <a:chOff x="0" y="0"/>
+          <a:chExt cx="0" cy="0"/>
+        </a:xfrm>
+      </p:grpSpPr>
+      <p:sp>
+        <p:nvSpPr>
+          <p:cNvPr id="2" name="Title 1"/>
+          <p:cNvSpPr>
+            <a:spLocks noGrp="1"/>
+          </p:cNvSpPr>
+          <p:nvPr>
+            <p:ph type="title"/>
+          </p:nvPr>
+        </p:nvSpPr>
+        <p:spPr/>
+        <p:txBody>
+          <a:bodyPr/>
+          <a:lstStyle/>
+          <a:p>
+            <a:r>
+              <a:rPr lang="en-US" dirty="0" smtClean="0"/>
+              <a:t>Detailed Functions Per User</a:t>
+            </a:r>
+            <a:endParaRPr lang="en-US" dirty="0"/>
+          </a:p>
+        </p:txBody>
+      </p:sp>
+      <p:sp>
+        <p:nvSpPr>
+          <p:cNvPr id="3" name="Content Placeholder 2"/>
+          <p:cNvSpPr>
+            <a:spLocks noGrp="1"/>
+          </p:cNvSpPr>
+          <p:nvPr>
+            <p:ph sz="quarter" idx="1"/>
+          </p:nvPr>
+        </p:nvSpPr>
+        <p:spPr/>
+        <p:txBody>
+          <a:bodyPr>
+            <a:normAutofit fontScale="77500" lnSpcReduction="20000"/>
+          </a:bodyPr>
+          <a:lstStyle/>
+          <a:p>
+            <a:r>
+              <a:rPr lang="en-US" dirty="0" smtClean="0"/>
+              <a:t>Customer</a:t>
+            </a:r>
+          </a:p>
+          <a:p>
+            <a:pPr lvl="1"/>
+            <a:r>
+              <a:rPr lang="en-US" dirty="0" smtClean="0"/>
+              <a:t>Register/Login/Logout</a:t>
+            </a:r>
+          </a:p>
+          <a:p>
+            <a:pPr lvl="1"/>
+            <a:r>
+              <a:rPr lang="en-US" dirty="0" smtClean="0"/>
+              <a:t>Browse products</a:t>
+            </a:r>
+          </a:p>
+          <a:p>
+            <a:pPr lvl="1"/>
+            <a:r>
+              <a:rPr lang="en-US" dirty="0" smtClean="0"/>
+              <a:t>Add to Cart</a:t>
+            </a:r>
+          </a:p>
+          <a:p>
+            <a:pPr lvl="1"/>
+            <a:r>
+              <a:rPr lang="en-US" dirty="0" smtClean="0"/>
+              <a:t>Edit cart</a:t>
+            </a:r>
+          </a:p>
+          <a:p>
+            <a:pPr lvl="1"/>
+            <a:r>
+              <a:rPr lang="en-US" dirty="0" smtClean="0"/>
+              <a:t>Remove product from cart</a:t>
+            </a:r>
+          </a:p>
+          <a:p>
+            <a:pPr lvl="1"/>
+            <a:r>
+              <a:rPr lang="en-US" dirty="0" smtClean="0"/>
+              <a:t>Add Product to favorite</a:t>
+            </a:r>
+          </a:p>
+          <a:p>
+            <a:pPr lvl="1"/>
+            <a:r>
+              <a:rPr lang="en-US" dirty="0" smtClean="0"/>
+              <a:t>Request for a premium account</a:t>
+            </a:r>
+          </a:p>
+          <a:p>
+            <a:pPr lvl="1"/>
+            <a:r>
+              <a:rPr lang="en-US" dirty="0" smtClean="0"/>
+              <a:t>View Product Details/Reviews</a:t>
+            </a:r>
+          </a:p>
+          <a:p>
+            <a:pPr lvl="1"/>
+            <a:r>
+              <a:rPr lang="en-US" dirty="0" smtClean="0"/>
+              <a:t>Post/Delete Product Reviews</a:t>
+            </a:r>
+          </a:p>
+          <a:p>
+            <a:pPr lvl="1"/>
+            <a:r>
+              <a:rPr lang="en-US" dirty="0" smtClean="0"/>
+              <a:t>Update account details</a:t>
+            </a:r>
+          </a:p>
+          <a:p>
+            <a:pPr lvl="1">
+              <a:buNone/>
+            </a:pPr>
+            <a:endParaRPr lang="en-US" dirty="0" smtClean="0"/>
+          </a:p>
+          <a:p>
+            <a:r>
+              <a:rPr lang="en-US" dirty="0" smtClean="0"/>
+              <a:t>Admin</a:t>
+            </a:r>
+          </a:p>
+          <a:p>
+            <a:pPr lvl="1"/>
+            <a:r>
+              <a:rPr lang="en-US" dirty="0" smtClean="0"/>
+              <a:t>Start Admin Topic consumer</a:t>
+            </a:r>
+          </a:p>
+          <a:p>
+            <a:pPr lvl="1"/>
+            <a:r>
+              <a:rPr lang="en-US" dirty="0" smtClean="0"/>
+              <a:t>Approve/Reject Customer premium requests</a:t>
+            </a:r>
+          </a:p>
+          <a:p>
+            <a:pPr lvl="1"/>
+            <a:r>
+              <a:rPr lang="en-US" dirty="0" smtClean="0"/>
+              <a:t>Manage User, Admin, Orders (CRUD)</a:t>
+            </a:r>
+          </a:p>
+          <a:p>
+            <a:pPr lvl="1"/>
+            <a:r>
+              <a:rPr lang="en-US" dirty="0" smtClean="0"/>
+              <a:t>Check online users</a:t>
+            </a:r>
+          </a:p>
+          <a:p>
+            <a:pPr lvl="1"/>
+            <a:endParaRPr lang="en-US" dirty="0" smtClean="0"/>
+          </a:p>
+          <a:p>
+            <a:endParaRPr lang="en-US" dirty="0" smtClean="0"/>
+          </a:p>
+          <a:p>
+            <a:pPr lvl="1"/>
+            <a:endParaRPr lang="en-US" dirty="0" smtClean="0"/>
+          </a:p>
+          <a:p>
+            <a:pPr lvl="1"/>
+            <a:endParaRPr lang="en-US" dirty="0" smtClean="0"/>
+          </a:p>
+          <a:p>
+            <a:endParaRPr lang="en-US" dirty="0" smtClean="0"/>
+          </a:p>
+        </p:txBody>
+      </p:sp>
+    </p:spTree>
+  </p:cSld>
+  <p:clrMapOvr>
+    <a:masterClrMapping/>
+  </p:clrMapOvr>
+</p:sld>
+</file>
+
+<file path=ppt/slides/slide18.xml><?xml version="1.0" encoding="utf-8"?>
 <p:sld xmlns:a="http://schemas.openxmlformats.org/drawingml/2006/main" xmlns:r="http://schemas.openxmlformats.org/officeDocument/2006/relationships" xmlns:p="http://schemas.openxmlformats.org/presentationml/2006/main">
   <p:cSld>
     <p:spTree>
@@ -7353,11 +7461,7 @@
             <a:pPr lvl="1"/>
             <a:r>
               <a:rPr lang="en-US" dirty="0" smtClean="0"/>
-              <a:t>No </a:t>
-            </a:r>
-            <a:r>
-              <a:rPr lang="en-US" dirty="0" smtClean="0"/>
-              <a:t>validation if premium code is valid</a:t>
+              <a:t>No validation if premium code is valid</a:t>
             </a:r>
           </a:p>
           <a:p>
@@ -7372,11 +7476,7 @@
             </a:r>
             <a:r>
               <a:rPr lang="en-US" dirty="0" smtClean="0"/>
-              <a:t> file</a:t>
-            </a:r>
-            <a:r>
-              <a:rPr lang="en-US" dirty="0" smtClean="0"/>
-              <a:t>)</a:t>
+              <a:t> file)</a:t>
             </a:r>
           </a:p>
           <a:p>
@@ -7385,7 +7485,6 @@
               <a:rPr lang="en-US" dirty="0" smtClean="0"/>
               <a:t>No confirm password</a:t>
             </a:r>
-            <a:endParaRPr lang="en-US" dirty="0" smtClean="0"/>
           </a:p>
           <a:p>
             <a:endParaRPr lang="en-US" dirty="0"/>
@@ -7489,7 +7588,6 @@
               <a:rPr lang="en-US" dirty="0" smtClean="0"/>
               <a:t>William</a:t>
             </a:r>
-            <a:endParaRPr lang="en-US" dirty="0" smtClean="0"/>
           </a:p>
           <a:p>
             <a:pPr lvl="1"/>
@@ -7547,7 +7645,6 @@
               <a:rPr lang="en-US" dirty="0" smtClean="0"/>
               <a:t>Lance</a:t>
             </a:r>
-            <a:endParaRPr lang="en-US" dirty="0" smtClean="0"/>
           </a:p>
           <a:p>
             <a:pPr lvl="1"/>
@@ -7657,11 +7754,7 @@
             <a:pPr lvl="1"/>
             <a:r>
               <a:rPr lang="en-US" dirty="0" smtClean="0"/>
-              <a:t>Refresh Handling (UI</a:t>
-            </a:r>
-            <a:r>
-              <a:rPr lang="en-US" dirty="0" smtClean="0"/>
-              <a:t>)</a:t>
+              <a:t>Refresh Handling (UI)</a:t>
             </a:r>
           </a:p>
           <a:p>
@@ -7695,22 +7788,14 @@
             <a:pPr lvl="1"/>
             <a:r>
               <a:rPr lang="en-US" dirty="0" smtClean="0"/>
-              <a:t>CRUD </a:t>
-            </a:r>
-            <a:r>
-              <a:rPr lang="en-US" dirty="0" smtClean="0"/>
-              <a:t>for Online Users (UI)</a:t>
+              <a:t>CRUD for Online Users (UI)</a:t>
             </a:r>
           </a:p>
           <a:p>
             <a:pPr lvl="1"/>
             <a:r>
               <a:rPr lang="en-US" dirty="0" smtClean="0"/>
-              <a:t>CRUD for Orders (UI</a:t>
-            </a:r>
-            <a:r>
-              <a:rPr lang="en-US" dirty="0" smtClean="0"/>
-              <a:t>)</a:t>
+              <a:t>CRUD for Orders (UI)</a:t>
             </a:r>
           </a:p>
           <a:p>
@@ -7839,26 +7924,14 @@
             <a:pPr lvl="1"/>
             <a:r>
               <a:rPr lang="en-US" dirty="0" smtClean="0"/>
-              <a:t>List of Online Users Controller (Backend</a:t>
-            </a:r>
-            <a:r>
-              <a:rPr lang="en-US" dirty="0" smtClean="0"/>
-              <a:t>)</a:t>
+              <a:t>List of Online Users Controller (Backend)</a:t>
             </a:r>
           </a:p>
           <a:p>
             <a:pPr lvl="1"/>
             <a:r>
               <a:rPr lang="en-US" dirty="0" smtClean="0"/>
-              <a:t>Refresh Handling (</a:t>
-            </a:r>
-            <a:r>
-              <a:rPr lang="en-US" dirty="0" smtClean="0"/>
-              <a:t>UI</a:t>
-            </a:r>
-            <a:r>
-              <a:rPr lang="en-US" dirty="0" smtClean="0"/>
-              <a:t>)</a:t>
+              <a:t>Refresh Handling (UI)</a:t>
             </a:r>
           </a:p>
         </p:txBody>

</xml_diff>